<commit_message>
acrescentei a "explicação" do operador de canny e só falta a conclusão
</commit_message>
<xml_diff>
--- a/DOCS/Apresentação/Apresentação_Final.pptx
+++ b/DOCS/Apresentação/Apresentação_Final.pptx
@@ -5,7 +5,7 @@
     <p:sldMasterId id="2147484104" r:id="rId1"/>
   </p:sldMasterIdLst>
   <p:notesMasterIdLst>
-    <p:notesMasterId r:id="rId14"/>
+    <p:notesMasterId r:id="rId15"/>
   </p:notesMasterIdLst>
   <p:sldIdLst>
     <p:sldId id="260" r:id="rId2"/>
@@ -19,7 +19,8 @@
     <p:sldId id="268" r:id="rId10"/>
     <p:sldId id="263" r:id="rId11"/>
     <p:sldId id="269" r:id="rId12"/>
-    <p:sldId id="270" r:id="rId13"/>
+    <p:sldId id="271" r:id="rId13"/>
+    <p:sldId id="270" r:id="rId14"/>
   </p:sldIdLst>
   <p:sldSz cx="9144000" cy="6858000" type="screen4x3"/>
   <p:notesSz cx="6858000" cy="9144000"/>
@@ -242,7 +243,7 @@
               <a:pPr>
                 <a:defRPr/>
               </a:pPr>
-              <a:t>23/11/2008</a:t>
+              <a:t>24/11/2008</a:t>
             </a:fld>
             <a:endParaRPr lang="pt-BR"/>
           </a:p>
@@ -782,7 +783,7 @@
               <a:pPr>
                 <a:defRPr/>
               </a:pPr>
-              <a:t>23/11/2008</a:t>
+              <a:t>24/11/2008</a:t>
             </a:fld>
             <a:endParaRPr lang="pt-BR"/>
           </a:p>
@@ -932,7 +933,7 @@
               <a:pPr>
                 <a:defRPr/>
               </a:pPr>
-              <a:t>23/11/2008</a:t>
+              <a:t>24/11/2008</a:t>
             </a:fld>
             <a:endParaRPr lang="pt-BR"/>
           </a:p>
@@ -1207,7 +1208,7 @@
               <a:pPr>
                 <a:defRPr/>
               </a:pPr>
-              <a:t>23/11/2008</a:t>
+              <a:t>24/11/2008</a:t>
             </a:fld>
             <a:endParaRPr lang="pt-BR"/>
           </a:p>
@@ -1403,7 +1404,7 @@
               <a:pPr>
                 <a:defRPr/>
               </a:pPr>
-              <a:t>23/11/2008</a:t>
+              <a:t>24/11/2008</a:t>
             </a:fld>
             <a:endParaRPr lang="pt-BR"/>
           </a:p>
@@ -1609,7 +1610,7 @@
               <a:pPr>
                 <a:defRPr/>
               </a:pPr>
-              <a:t>23/11/2008</a:t>
+              <a:t>24/11/2008</a:t>
             </a:fld>
             <a:endParaRPr lang="pt-BR"/>
           </a:p>
@@ -1726,7 +1727,7 @@
               <a:pPr>
                 <a:defRPr/>
               </a:pPr>
-              <a:t>23/11/2008</a:t>
+              <a:t>24/11/2008</a:t>
             </a:fld>
             <a:endParaRPr lang="pt-BR"/>
           </a:p>
@@ -2504,7 +2505,7 @@
               <a:pPr>
                 <a:defRPr/>
               </a:pPr>
-              <a:t>23/11/2008</a:t>
+              <a:t>24/11/2008</a:t>
             </a:fld>
             <a:endParaRPr lang="pt-BR"/>
           </a:p>
@@ -3289,14 +3290,43 @@
                 <a:ea typeface="+mj-ea"/>
                 <a:cs typeface="Tahoma" pitchFamily="34" charset="0"/>
               </a:rPr>
-              <a:t>Resultados Esperados</a:t>
+              <a:t>Resultados </a:t>
             </a:r>
+            <a:r>
+              <a:rPr lang="pt-BR" sz="4400" b="1" u="none" cap="all" dirty="0" smtClean="0">
+                <a:solidFill>
+                  <a:schemeClr val="tx2">
+                    <a:satMod val="200000"/>
+                  </a:schemeClr>
+                </a:solidFill>
+                <a:effectLst>
+                  <a:reflection blurRad="12700" stA="34000" endA="740" endPos="53000" dir="5400000" sy="-100000" algn="bl" rotWithShape="0"/>
+                </a:effectLst>
+                <a:latin typeface="Tahoma" pitchFamily="34" charset="0"/>
+                <a:ea typeface="+mj-ea"/>
+                <a:cs typeface="Tahoma" pitchFamily="34" charset="0"/>
+              </a:rPr>
+              <a:t>obtidos</a:t>
+            </a:r>
+            <a:endParaRPr lang="pt-BR" sz="4400" b="1" u="none" cap="all" dirty="0">
+              <a:solidFill>
+                <a:schemeClr val="tx2">
+                  <a:satMod val="200000"/>
+                </a:schemeClr>
+              </a:solidFill>
+              <a:effectLst>
+                <a:reflection blurRad="12700" stA="34000" endA="740" endPos="53000" dir="5400000" sy="-100000" algn="bl" rotWithShape="0"/>
+              </a:effectLst>
+              <a:latin typeface="Tahoma" pitchFamily="34" charset="0"/>
+              <a:ea typeface="+mj-ea"/>
+              <a:cs typeface="Tahoma" pitchFamily="34" charset="0"/>
+            </a:endParaRPr>
           </a:p>
         </p:txBody>
       </p:sp>
       <p:pic>
         <p:nvPicPr>
-          <p:cNvPr id="12291" name="Picture 3" descr="C:\Documents and Settings\Thiago Mizutani\Meus documentos\FEI\TCC\TCC Master\LATEX\imagens\preview1.PNG"/>
+          <p:cNvPr id="14338" name="Picture 2" descr="C:\Documents and Settings\Mizu\Meus documentos\FEI\TCC\LATEX\imagens\resultados_obtidos1.PNG"/>
           <p:cNvPicPr>
             <a:picLocks noChangeAspect="1" noChangeArrowheads="1"/>
           </p:cNvPicPr>
@@ -3311,19 +3341,13 @@
         </p:blipFill>
         <p:spPr bwMode="auto">
           <a:xfrm>
-            <a:off x="1130300" y="1252538"/>
-            <a:ext cx="7000875" cy="5462587"/>
+            <a:off x="928662" y="1000108"/>
+            <a:ext cx="7734330" cy="5568076"/>
           </a:xfrm>
           <a:prstGeom prst="rect">
             <a:avLst/>
           </a:prstGeom>
           <a:noFill/>
-          <a:ln w="9525">
-            <a:noFill/>
-            <a:miter lim="800000"/>
-            <a:headEnd/>
-            <a:tailEnd/>
-          </a:ln>
         </p:spPr>
       </p:pic>
     </p:spTree>
@@ -3400,14 +3424,43 @@
                 <a:ea typeface="+mj-ea"/>
                 <a:cs typeface="Tahoma" pitchFamily="34" charset="0"/>
               </a:rPr>
-              <a:t>Resultados Esperados</a:t>
+              <a:t>Resultados </a:t>
             </a:r>
+            <a:r>
+              <a:rPr lang="pt-BR" sz="4400" b="1" u="none" cap="all" dirty="0" smtClean="0">
+                <a:solidFill>
+                  <a:schemeClr val="tx2">
+                    <a:satMod val="200000"/>
+                  </a:schemeClr>
+                </a:solidFill>
+                <a:effectLst>
+                  <a:reflection blurRad="12700" stA="34000" endA="740" endPos="53000" dir="5400000" sy="-100000" algn="bl" rotWithShape="0"/>
+                </a:effectLst>
+                <a:latin typeface="Tahoma" pitchFamily="34" charset="0"/>
+                <a:ea typeface="+mj-ea"/>
+                <a:cs typeface="Tahoma" pitchFamily="34" charset="0"/>
+              </a:rPr>
+              <a:t>obtidos</a:t>
+            </a:r>
+            <a:endParaRPr lang="pt-BR" sz="4400" b="1" u="none" cap="all" dirty="0">
+              <a:solidFill>
+                <a:schemeClr val="tx2">
+                  <a:satMod val="200000"/>
+                </a:schemeClr>
+              </a:solidFill>
+              <a:effectLst>
+                <a:reflection blurRad="12700" stA="34000" endA="740" endPos="53000" dir="5400000" sy="-100000" algn="bl" rotWithShape="0"/>
+              </a:effectLst>
+              <a:latin typeface="Tahoma" pitchFamily="34" charset="0"/>
+              <a:ea typeface="+mj-ea"/>
+              <a:cs typeface="Tahoma" pitchFamily="34" charset="0"/>
+            </a:endParaRPr>
           </a:p>
         </p:txBody>
       </p:sp>
       <p:pic>
         <p:nvPicPr>
-          <p:cNvPr id="13315" name="Picture 2" descr="C:\Documents and Settings\Thiago Mizutani\Meus documentos\FEI\TCC\TCC Master\LATEX\imagens\preview2.PNG"/>
+          <p:cNvPr id="5" name="Picture 2" descr="C:\Documents and Settings\Mizu\Meus documentos\FEI\TCC\LATEX\imagens\resultados_obtidos2.PNG"/>
           <p:cNvPicPr>
             <a:picLocks noChangeAspect="1" noChangeArrowheads="1"/>
           </p:cNvPicPr>
@@ -3422,19 +3475,13 @@
         </p:blipFill>
         <p:spPr bwMode="auto">
           <a:xfrm>
-            <a:off x="1143000" y="1285875"/>
-            <a:ext cx="7000875" cy="5454650"/>
+            <a:off x="928662" y="981566"/>
+            <a:ext cx="7762936" cy="5588669"/>
           </a:xfrm>
           <a:prstGeom prst="rect">
             <a:avLst/>
           </a:prstGeom>
           <a:noFill/>
-          <a:ln w="9525">
-            <a:noFill/>
-            <a:miter lim="800000"/>
-            <a:headEnd/>
-            <a:tailEnd/>
-          </a:ln>
         </p:spPr>
       </p:pic>
     </p:spTree>
@@ -3471,7 +3518,7 @@
       </p:grpSpPr>
       <p:sp>
         <p:nvSpPr>
-          <p:cNvPr id="3" name="Título 1"/>
+          <p:cNvPr id="6" name="Título 1"/>
           <p:cNvSpPr txBox="1">
             <a:spLocks/>
           </p:cNvSpPr>
@@ -3510,14 +3557,43 @@
                 <a:ea typeface="+mj-ea"/>
                 <a:cs typeface="Tahoma" pitchFamily="34" charset="0"/>
               </a:rPr>
-              <a:t>Resultados Esperados</a:t>
+              <a:t>Resultados </a:t>
             </a:r>
+            <a:r>
+              <a:rPr lang="pt-BR" sz="4400" b="1" u="none" cap="all" dirty="0" smtClean="0">
+                <a:solidFill>
+                  <a:schemeClr val="tx2">
+                    <a:satMod val="200000"/>
+                  </a:schemeClr>
+                </a:solidFill>
+                <a:effectLst>
+                  <a:reflection blurRad="12700" stA="34000" endA="740" endPos="53000" dir="5400000" sy="-100000" algn="bl" rotWithShape="0"/>
+                </a:effectLst>
+                <a:latin typeface="Tahoma" pitchFamily="34" charset="0"/>
+                <a:ea typeface="+mj-ea"/>
+                <a:cs typeface="Tahoma" pitchFamily="34" charset="0"/>
+              </a:rPr>
+              <a:t>obtidos</a:t>
+            </a:r>
+            <a:endParaRPr lang="pt-BR" sz="4400" b="1" u="none" cap="all" dirty="0">
+              <a:solidFill>
+                <a:schemeClr val="tx2">
+                  <a:satMod val="200000"/>
+                </a:schemeClr>
+              </a:solidFill>
+              <a:effectLst>
+                <a:reflection blurRad="12700" stA="34000" endA="740" endPos="53000" dir="5400000" sy="-100000" algn="bl" rotWithShape="0"/>
+              </a:effectLst>
+              <a:latin typeface="Tahoma" pitchFamily="34" charset="0"/>
+              <a:ea typeface="+mj-ea"/>
+              <a:cs typeface="Tahoma" pitchFamily="34" charset="0"/>
+            </a:endParaRPr>
           </a:p>
         </p:txBody>
       </p:sp>
       <p:pic>
         <p:nvPicPr>
-          <p:cNvPr id="14339" name="Picture 2" descr="C:\Documents and Settings\Thiago Mizutani\Meus documentos\FEI\TCC\TCC Master\LATEX\imagens\preview3.PNG"/>
+          <p:cNvPr id="7" name="Picture 2" descr="C:\Documents and Settings\Mizu\Meus documentos\FEI\TCC\LATEX\imagens\resultados_obtidos3.PNG"/>
           <p:cNvPicPr>
             <a:picLocks noChangeAspect="1" noChangeArrowheads="1"/>
           </p:cNvPicPr>
@@ -3532,21 +3608,106 @@
         </p:blipFill>
         <p:spPr bwMode="auto">
           <a:xfrm>
-            <a:off x="1143000" y="1285875"/>
-            <a:ext cx="7000875" cy="5454650"/>
+            <a:off x="928662" y="1000107"/>
+            <a:ext cx="7715304" cy="5554377"/>
           </a:xfrm>
           <a:prstGeom prst="rect">
             <a:avLst/>
           </a:prstGeom>
           <a:noFill/>
-          <a:ln w="9525">
-            <a:noFill/>
-            <a:miter lim="800000"/>
-            <a:headEnd/>
-            <a:tailEnd/>
-          </a:ln>
         </p:spPr>
       </p:pic>
+    </p:spTree>
+  </p:cSld>
+  <p:clrMapOvr>
+    <a:masterClrMapping/>
+  </p:clrMapOvr>
+  <p:timing>
+    <p:tnLst>
+      <p:par>
+        <p:cTn id="1" dur="indefinite" restart="never" nodeType="tmRoot"/>
+      </p:par>
+    </p:tnLst>
+  </p:timing>
+</p:sld>
+</file>
+
+<file path=ppt/slides/slide13.xml><?xml version="1.0" encoding="utf-8"?>
+<p:sld xmlns:a="http://schemas.openxmlformats.org/drawingml/2006/main" xmlns:r="http://schemas.openxmlformats.org/officeDocument/2006/relationships" xmlns:p="http://schemas.openxmlformats.org/presentationml/2006/main">
+  <p:cSld>
+    <p:spTree>
+      <p:nvGrpSpPr>
+        <p:cNvPr id="1" name=""/>
+        <p:cNvGrpSpPr/>
+        <p:nvPr/>
+      </p:nvGrpSpPr>
+      <p:grpSpPr>
+        <a:xfrm>
+          <a:off x="0" y="0"/>
+          <a:ext cx="0" cy="0"/>
+          <a:chOff x="0" y="0"/>
+          <a:chExt cx="0" cy="0"/>
+        </a:xfrm>
+      </p:grpSpPr>
+      <p:sp>
+        <p:nvSpPr>
+          <p:cNvPr id="3" name="Título 1"/>
+          <p:cNvSpPr txBox="1">
+            <a:spLocks/>
+          </p:cNvSpPr>
+          <p:nvPr/>
+        </p:nvSpPr>
+        <p:spPr>
+          <a:xfrm>
+            <a:off x="857224" y="214290"/>
+            <a:ext cx="7772400" cy="914400"/>
+          </a:xfrm>
+          <a:prstGeom prst="rect">
+            <a:avLst/>
+          </a:prstGeom>
+        </p:spPr>
+        <p:txBody>
+          <a:bodyPr/>
+          <a:lstStyle/>
+          <a:p>
+            <a:pPr algn="ctr" fontAlgn="auto">
+              <a:spcAft>
+                <a:spcPts val="0"/>
+              </a:spcAft>
+              <a:defRPr/>
+            </a:pPr>
+            <a:r>
+              <a:rPr lang="pt-BR" sz="4400" b="1" u="none" cap="all" dirty="0" smtClean="0">
+                <a:solidFill>
+                  <a:schemeClr val="tx2">
+                    <a:satMod val="200000"/>
+                  </a:schemeClr>
+                </a:solidFill>
+                <a:effectLst>
+                  <a:reflection blurRad="12700" stA="34000" endA="740" endPos="53000" dir="5400000" sy="-100000" algn="bl" rotWithShape="0"/>
+                </a:effectLst>
+                <a:latin typeface="Tahoma" pitchFamily="34" charset="0"/>
+                <a:ea typeface="+mj-ea"/>
+                <a:cs typeface="Tahoma" pitchFamily="34" charset="0"/>
+              </a:rPr>
+              <a:t>conclusão</a:t>
+            </a:r>
+            <a:endParaRPr lang="pt-BR" sz="4400" b="1" u="none" cap="all" dirty="0">
+              <a:solidFill>
+                <a:schemeClr val="tx2">
+                  <a:satMod val="200000"/>
+                </a:schemeClr>
+              </a:solidFill>
+              <a:effectLst>
+                <a:reflection blurRad="12700" stA="34000" endA="740" endPos="53000" dir="5400000" sy="-100000" algn="bl" rotWithShape="0"/>
+              </a:effectLst>
+              <a:latin typeface="Tahoma" pitchFamily="34" charset="0"/>
+              <a:ea typeface="+mj-ea"/>
+              <a:cs typeface="Tahoma" pitchFamily="34" charset="0"/>
+            </a:endParaRPr>
+          </a:p>
+        </p:txBody>
+      </p:sp>
     </p:spTree>
   </p:cSld>
   <p:clrMapOvr>
@@ -4196,7 +4357,7 @@
               <a:buChar char=""/>
             </a:pPr>
             <a:r>
-              <a:rPr lang="pt-BR" sz="3000" u="none">
+              <a:rPr lang="pt-BR" sz="3000" u="none" dirty="0">
                 <a:latin typeface="Corbel" pitchFamily="34" charset="0"/>
               </a:rPr>
               <a:t>Desenvolver uma ferramenta capaz de automatizar o processo de detecção de transições de um vídeo</a:t>
@@ -4214,7 +4375,7 @@
               <a:buFont typeface="Wingdings" pitchFamily="2" charset="2"/>
               <a:buNone/>
             </a:pPr>
-            <a:endParaRPr lang="pt-BR" sz="3000" u="none">
+            <a:endParaRPr lang="pt-BR" sz="3000" u="none" dirty="0">
               <a:latin typeface="Corbel" pitchFamily="34" charset="0"/>
             </a:endParaRPr>
           </a:p>
@@ -4952,186 +5113,7 @@
   <p:timing>
     <p:tnLst>
       <p:par>
-        <p:cTn id="1" dur="indefinite" restart="never" nodeType="tmRoot">
-          <p:childTnLst>
-            <p:seq concurrent="1" nextAc="seek">
-              <p:cTn id="2" dur="indefinite" nodeType="mainSeq">
-                <p:childTnLst>
-                  <p:par>
-                    <p:cTn id="3" fill="hold">
-                      <p:stCondLst>
-                        <p:cond delay="indefinite"/>
-                        <p:cond evt="onBegin" delay="0">
-                          <p:tn val="2"/>
-                        </p:cond>
-                      </p:stCondLst>
-                      <p:childTnLst>
-                        <p:par>
-                          <p:cTn id="4" fill="hold">
-                            <p:stCondLst>
-                              <p:cond delay="0"/>
-                            </p:stCondLst>
-                            <p:childTnLst>
-                              <p:par>
-                                <p:cTn id="5" presetID="1" presetClass="entr" presetSubtype="0" fill="hold" nodeType="afterEffect">
-                                  <p:stCondLst>
-                                    <p:cond delay="0"/>
-                                  </p:stCondLst>
-                                  <p:childTnLst>
-                                    <p:set>
-                                      <p:cBhvr>
-                                        <p:cTn id="6" dur="1" fill="hold">
-                                          <p:stCondLst>
-                                            <p:cond delay="0"/>
-                                          </p:stCondLst>
-                                        </p:cTn>
-                                        <p:tgtEl>
-                                          <p:spTgt spid="6"/>
-                                        </p:tgtEl>
-                                        <p:attrNameLst>
-                                          <p:attrName>style.visibility</p:attrName>
-                                        </p:attrNameLst>
-                                      </p:cBhvr>
-                                      <p:to>
-                                        <p:strVal val="visible"/>
-                                      </p:to>
-                                    </p:set>
-                                  </p:childTnLst>
-                                </p:cTn>
-                              </p:par>
-                            </p:childTnLst>
-                          </p:cTn>
-                        </p:par>
-                        <p:par>
-                          <p:cTn id="7" fill="hold">
-                            <p:stCondLst>
-                              <p:cond delay="0"/>
-                            </p:stCondLst>
-                            <p:childTnLst>
-                              <p:par>
-                                <p:cTn id="8" presetID="1" presetClass="entr" presetSubtype="0" fill="hold" nodeType="afterEffect">
-                                  <p:stCondLst>
-                                    <p:cond delay="0"/>
-                                  </p:stCondLst>
-                                  <p:childTnLst>
-                                    <p:set>
-                                      <p:cBhvr>
-                                        <p:cTn id="9" dur="1" fill="hold">
-                                          <p:stCondLst>
-                                            <p:cond delay="0"/>
-                                          </p:stCondLst>
-                                        </p:cTn>
-                                        <p:tgtEl>
-                                          <p:spTgt spid="5"/>
-                                        </p:tgtEl>
-                                        <p:attrNameLst>
-                                          <p:attrName>style.visibility</p:attrName>
-                                        </p:attrNameLst>
-                                      </p:cBhvr>
-                                      <p:to>
-                                        <p:strVal val="visible"/>
-                                      </p:to>
-                                    </p:set>
-                                  </p:childTnLst>
-                                </p:cTn>
-                              </p:par>
-                            </p:childTnLst>
-                          </p:cTn>
-                        </p:par>
-                        <p:par>
-                          <p:cTn id="10" fill="hold">
-                            <p:stCondLst>
-                              <p:cond delay="0"/>
-                            </p:stCondLst>
-                            <p:childTnLst>
-                              <p:par>
-                                <p:cTn id="11" presetID="1" presetClass="entr" presetSubtype="0" fill="hold" nodeType="afterEffect">
-                                  <p:stCondLst>
-                                    <p:cond delay="0"/>
-                                  </p:stCondLst>
-                                  <p:childTnLst>
-                                    <p:set>
-                                      <p:cBhvr>
-                                        <p:cTn id="12" dur="1" fill="hold">
-                                          <p:stCondLst>
-                                            <p:cond delay="0"/>
-                                          </p:stCondLst>
-                                        </p:cTn>
-                                        <p:tgtEl>
-                                          <p:spTgt spid="4"/>
-                                        </p:tgtEl>
-                                        <p:attrNameLst>
-                                          <p:attrName>style.visibility</p:attrName>
-                                        </p:attrNameLst>
-                                      </p:cBhvr>
-                                      <p:to>
-                                        <p:strVal val="visible"/>
-                                      </p:to>
-                                    </p:set>
-                                  </p:childTnLst>
-                                </p:cTn>
-                              </p:par>
-                            </p:childTnLst>
-                          </p:cTn>
-                        </p:par>
-                        <p:par>
-                          <p:cTn id="13" fill="hold">
-                            <p:stCondLst>
-                              <p:cond delay="0"/>
-                            </p:stCondLst>
-                            <p:childTnLst>
-                              <p:par>
-                                <p:cTn id="14" presetID="1" presetClass="entr" presetSubtype="0" fill="hold" nodeType="afterEffect">
-                                  <p:stCondLst>
-                                    <p:cond delay="0"/>
-                                  </p:stCondLst>
-                                  <p:childTnLst>
-                                    <p:set>
-                                      <p:cBhvr>
-                                        <p:cTn id="15" dur="1" fill="hold">
-                                          <p:stCondLst>
-                                            <p:cond delay="0"/>
-                                          </p:stCondLst>
-                                        </p:cTn>
-                                        <p:tgtEl>
-                                          <p:spTgt spid="3"/>
-                                        </p:tgtEl>
-                                        <p:attrNameLst>
-                                          <p:attrName>style.visibility</p:attrName>
-                                        </p:attrNameLst>
-                                      </p:cBhvr>
-                                      <p:to>
-                                        <p:strVal val="visible"/>
-                                      </p:to>
-                                    </p:set>
-                                  </p:childTnLst>
-                                </p:cTn>
-                              </p:par>
-                            </p:childTnLst>
-                          </p:cTn>
-                        </p:par>
-                      </p:childTnLst>
-                    </p:cTn>
-                  </p:par>
-                </p:childTnLst>
-              </p:cTn>
-              <p:prevCondLst>
-                <p:cond evt="onPrev" delay="0">
-                  <p:tgtEl>
-                    <p:sldTgt/>
-                  </p:tgtEl>
-                </p:cond>
-              </p:prevCondLst>
-              <p:nextCondLst>
-                <p:cond evt="onNext" delay="0">
-                  <p:tgtEl>
-                    <p:sldTgt/>
-                  </p:tgtEl>
-                </p:cond>
-              </p:nextCondLst>
-            </p:seq>
-          </p:childTnLst>
-        </p:cTn>
+        <p:cTn id="1" dur="indefinite" restart="never" nodeType="tmRoot"/>
       </p:par>
     </p:tnLst>
   </p:timing>
@@ -10793,108 +10775,6 @@
           </a:p>
         </p:txBody>
       </p:sp>
-      <p:pic>
-        <p:nvPicPr>
-          <p:cNvPr id="10376" name="Picture 1160" descr="C:\Documents and Settings\Mizu\Meus documentos\FEI\TCC\DOCS\Apresentação\RV_semWide.JPG"/>
-          <p:cNvPicPr>
-            <a:picLocks noChangeAspect="1" noChangeArrowheads="1"/>
-          </p:cNvPicPr>
-          <p:nvPr/>
-        </p:nvPicPr>
-        <p:blipFill>
-          <a:blip r:embed="rId3"/>
-          <a:srcRect/>
-          <a:stretch>
-            <a:fillRect/>
-          </a:stretch>
-        </p:blipFill>
-        <p:spPr bwMode="auto">
-          <a:xfrm>
-            <a:off x="5000628" y="4572008"/>
-            <a:ext cx="3929026" cy="1932308"/>
-          </a:xfrm>
-          <a:prstGeom prst="rect">
-            <a:avLst/>
-          </a:prstGeom>
-          <a:ln w="190500" cap="sq">
-            <a:solidFill>
-              <a:srgbClr val="C8C6BD"/>
-            </a:solidFill>
-            <a:prstDash val="solid"/>
-            <a:miter lim="800000"/>
-          </a:ln>
-          <a:effectLst>
-            <a:outerShdw blurRad="254000" algn="bl" rotWithShape="0">
-              <a:srgbClr val="000000">
-                <a:alpha val="43000"/>
-              </a:srgbClr>
-            </a:outerShdw>
-          </a:effectLst>
-          <a:scene3d>
-            <a:camera prst="perspectiveFront" fov="5400000"/>
-            <a:lightRig rig="threePt" dir="t">
-              <a:rot lat="0" lon="0" rev="2100000"/>
-            </a:lightRig>
-          </a:scene3d>
-          <a:sp3d extrusionH="25400">
-            <a:bevelT w="304800" h="152400" prst="hardEdge"/>
-            <a:extrusionClr>
-              <a:srgbClr val="000000"/>
-            </a:extrusionClr>
-          </a:sp3d>
-        </p:spPr>
-      </p:pic>
-      <p:pic>
-        <p:nvPicPr>
-          <p:cNvPr id="10375" name="Picture 1159" descr="C:\Documents and Settings\Mizu\Meus documentos\FEI\TCC\DOCS\Apresentação\RV.JPG"/>
-          <p:cNvPicPr>
-            <a:picLocks noChangeAspect="1" noChangeArrowheads="1"/>
-          </p:cNvPicPr>
-          <p:nvPr/>
-        </p:nvPicPr>
-        <p:blipFill>
-          <a:blip r:embed="rId4"/>
-          <a:srcRect/>
-          <a:stretch>
-            <a:fillRect/>
-          </a:stretch>
-        </p:blipFill>
-        <p:spPr bwMode="auto">
-          <a:xfrm>
-            <a:off x="728952" y="2121496"/>
-            <a:ext cx="4017598" cy="3093454"/>
-          </a:xfrm>
-          <a:prstGeom prst="rect">
-            <a:avLst/>
-          </a:prstGeom>
-          <a:ln w="190500" cap="sq">
-            <a:solidFill>
-              <a:srgbClr val="C8C6BD"/>
-            </a:solidFill>
-            <a:prstDash val="solid"/>
-            <a:miter lim="800000"/>
-          </a:ln>
-          <a:effectLst>
-            <a:outerShdw blurRad="254000" algn="bl" rotWithShape="0">
-              <a:srgbClr val="000000">
-                <a:alpha val="43000"/>
-              </a:srgbClr>
-            </a:outerShdw>
-          </a:effectLst>
-          <a:scene3d>
-            <a:camera prst="perspectiveFront" fov="5400000"/>
-            <a:lightRig rig="threePt" dir="t">
-              <a:rot lat="0" lon="0" rev="2100000"/>
-            </a:lightRig>
-          </a:scene3d>
-          <a:sp3d extrusionH="25400">
-            <a:bevelT w="304800" h="152400" prst="hardEdge"/>
-            <a:extrusionClr>
-              <a:srgbClr val="000000"/>
-            </a:extrusionClr>
-          </a:sp3d>
-        </p:spPr>
-      </p:pic>
       <p:sp>
         <p:nvSpPr>
           <p:cNvPr id="7" name="Seta dobrada 6"/>
@@ -10946,123 +10826,7 @@
   <p:timing>
     <p:tnLst>
       <p:par>
-        <p:cTn id="1" dur="indefinite" restart="never" nodeType="tmRoot">
-          <p:childTnLst>
-            <p:seq concurrent="1" nextAc="seek">
-              <p:cTn id="2" dur="indefinite" nodeType="mainSeq">
-                <p:childTnLst>
-                  <p:par>
-                    <p:cTn id="3" fill="hold">
-                      <p:stCondLst>
-                        <p:cond delay="indefinite"/>
-                        <p:cond evt="onBegin" delay="0">
-                          <p:tn val="2"/>
-                        </p:cond>
-                      </p:stCondLst>
-                      <p:childTnLst>
-                        <p:par>
-                          <p:cTn id="4" fill="hold">
-                            <p:stCondLst>
-                              <p:cond delay="0"/>
-                            </p:stCondLst>
-                            <p:childTnLst>
-                              <p:par>
-                                <p:cTn id="5" presetID="1" presetClass="entr" presetSubtype="0" fill="hold" nodeType="afterEffect">
-                                  <p:stCondLst>
-                                    <p:cond delay="0"/>
-                                  </p:stCondLst>
-                                  <p:childTnLst>
-                                    <p:set>
-                                      <p:cBhvr>
-                                        <p:cTn id="6" dur="1" fill="hold">
-                                          <p:stCondLst>
-                                            <p:cond delay="0"/>
-                                          </p:stCondLst>
-                                        </p:cTn>
-                                        <p:tgtEl>
-                                          <p:spTgt spid="10375"/>
-                                        </p:tgtEl>
-                                        <p:attrNameLst>
-                                          <p:attrName>style.visibility</p:attrName>
-                                        </p:attrNameLst>
-                                      </p:cBhvr>
-                                      <p:to>
-                                        <p:strVal val="visible"/>
-                                      </p:to>
-                                    </p:set>
-                                  </p:childTnLst>
-                                </p:cTn>
-                              </p:par>
-                            </p:childTnLst>
-                          </p:cTn>
-                        </p:par>
-                      </p:childTnLst>
-                    </p:cTn>
-                  </p:par>
-                  <p:par>
-                    <p:cTn id="7" fill="hold">
-                      <p:stCondLst>
-                        <p:cond delay="indefinite"/>
-                      </p:stCondLst>
-                      <p:childTnLst>
-                        <p:par>
-                          <p:cTn id="8" fill="hold">
-                            <p:stCondLst>
-                              <p:cond delay="0"/>
-                            </p:stCondLst>
-                            <p:childTnLst>
-                              <p:par>
-                                <p:cTn id="9" presetID="1" presetClass="exit" presetSubtype="0" fill="hold" nodeType="clickEffect">
-                                  <p:stCondLst>
-                                    <p:cond delay="0"/>
-                                  </p:stCondLst>
-                                  <p:childTnLst>
-                                    <p:set>
-                                      <p:cBhvr>
-                                        <p:cTn id="10" dur="1" fill="hold">
-                                          <p:stCondLst>
-                                            <p:cond delay="0"/>
-                                          </p:stCondLst>
-                                        </p:cTn>
-                                        <p:tgtEl>
-                                          <p:spTgt spid="10375"/>
-                                        </p:tgtEl>
-                                        <p:attrNameLst>
-                                          <p:attrName>style.visibility</p:attrName>
-                                        </p:attrNameLst>
-                                      </p:cBhvr>
-                                      <p:to>
-                                        <p:strVal val="hidden"/>
-                                      </p:to>
-                                    </p:set>
-                                  </p:childTnLst>
-                                </p:cTn>
-                              </p:par>
-                            </p:childTnLst>
-                          </p:cTn>
-                        </p:par>
-                      </p:childTnLst>
-                    </p:cTn>
-                  </p:par>
-                </p:childTnLst>
-              </p:cTn>
-              <p:prevCondLst>
-                <p:cond evt="onPrev" delay="0">
-                  <p:tgtEl>
-                    <p:sldTgt/>
-                  </p:tgtEl>
-                </p:cond>
-              </p:prevCondLst>
-              <p:nextCondLst>
-                <p:cond evt="onNext" delay="0">
-                  <p:tgtEl>
-                    <p:sldTgt/>
-                  </p:tgtEl>
-                </p:cond>
-              </p:nextCondLst>
-            </p:seq>
-          </p:childTnLst>
-        </p:cTn>
+        <p:cTn id="1" dur="indefinite" restart="never" nodeType="tmRoot"/>
       </p:par>
     </p:tnLst>
   </p:timing>
@@ -11217,12 +10981,210 @@
           </a:p>
         </p:txBody>
       </p:sp>
+      <p:sp>
+        <p:nvSpPr>
+          <p:cNvPr id="4" name="CaixaDeTexto 3"/>
+          <p:cNvSpPr txBox="1"/>
+          <p:nvPr/>
+        </p:nvSpPr>
+        <p:spPr>
+          <a:xfrm>
+            <a:off x="5500694" y="1214422"/>
+            <a:ext cx="184731" cy="369332"/>
+          </a:xfrm>
+          <a:prstGeom prst="rect">
+            <a:avLst/>
+          </a:prstGeom>
+          <a:noFill/>
+        </p:spPr>
+        <p:txBody>
+          <a:bodyPr wrap="none" rtlCol="0">
+            <a:spAutoFit/>
+          </a:bodyPr>
+          <a:lstStyle/>
+          <a:p>
+            <a:endParaRPr lang="pt-BR" dirty="0"/>
+          </a:p>
+        </p:txBody>
+      </p:sp>
+      <p:sp>
+        <p:nvSpPr>
+          <p:cNvPr id="6" name="Retângulo 5"/>
+          <p:cNvSpPr/>
+          <p:nvPr/>
+        </p:nvSpPr>
+        <p:spPr>
+          <a:xfrm>
+            <a:off x="357158" y="1857364"/>
+            <a:ext cx="3714776" cy="1379865"/>
+          </a:xfrm>
+          <a:prstGeom prst="rect">
+            <a:avLst/>
+          </a:prstGeom>
+        </p:spPr>
+        <p:txBody>
+          <a:bodyPr wrap="square">
+            <a:spAutoFit/>
+          </a:bodyPr>
+          <a:lstStyle/>
+          <a:p>
+            <a:pPr marL="411163" indent="-342900">
+              <a:spcBef>
+                <a:spcPts val="700"/>
+              </a:spcBef>
+              <a:buClr>
+                <a:schemeClr val="tx2"/>
+              </a:buClr>
+              <a:buSzPct val="95000"/>
+              <a:buFont typeface="Wingdings" pitchFamily="2" charset="2"/>
+              <a:buChar char=""/>
+            </a:pPr>
+            <a:r>
+              <a:rPr lang="pt-BR" sz="2400" u="none" dirty="0" err="1" smtClean="0">
+                <a:latin typeface="Corbel" pitchFamily="34" charset="0"/>
+              </a:rPr>
+              <a:t>Convolução</a:t>
+            </a:r>
+            <a:r>
+              <a:rPr lang="pt-BR" sz="2400" u="none" dirty="0" smtClean="0">
+                <a:latin typeface="Corbel" pitchFamily="34" charset="0"/>
+              </a:rPr>
+              <a:t> da Imagem</a:t>
+            </a:r>
+          </a:p>
+          <a:p>
+            <a:pPr marL="411163" indent="-342900">
+              <a:spcBef>
+                <a:spcPts val="700"/>
+              </a:spcBef>
+              <a:buClr>
+                <a:schemeClr val="tx2"/>
+              </a:buClr>
+              <a:buSzPct val="95000"/>
+              <a:buFont typeface="Wingdings" pitchFamily="2" charset="2"/>
+              <a:buChar char=""/>
+            </a:pPr>
+            <a:r>
+              <a:rPr lang="pt-BR" sz="2400" u="none" dirty="0" smtClean="0">
+                <a:latin typeface="Corbel" pitchFamily="34" charset="0"/>
+              </a:rPr>
+              <a:t>Supressão Não Máxima</a:t>
+            </a:r>
+          </a:p>
+          <a:p>
+            <a:pPr marL="411163" indent="-342900">
+              <a:spcBef>
+                <a:spcPts val="700"/>
+              </a:spcBef>
+              <a:buClr>
+                <a:schemeClr val="tx2"/>
+              </a:buClr>
+              <a:buSzPct val="95000"/>
+              <a:buFont typeface="Wingdings" pitchFamily="2" charset="2"/>
+              <a:buChar char=""/>
+            </a:pPr>
+            <a:r>
+              <a:rPr lang="pt-BR" sz="2400" u="none" dirty="0" smtClean="0">
+                <a:latin typeface="Corbel" pitchFamily="34" charset="0"/>
+              </a:rPr>
+              <a:t>Histerese</a:t>
+            </a:r>
+          </a:p>
+        </p:txBody>
+      </p:sp>
+      <p:grpSp>
+        <p:nvGrpSpPr>
+          <p:cNvPr id="13" name="Grupo 12"/>
+          <p:cNvGrpSpPr/>
+          <p:nvPr/>
+        </p:nvGrpSpPr>
+        <p:grpSpPr>
+          <a:xfrm>
+            <a:off x="4214810" y="2000240"/>
+            <a:ext cx="4657730" cy="4071966"/>
+            <a:chOff x="4832352" y="3143248"/>
+            <a:chExt cx="3943350" cy="3432187"/>
+          </a:xfrm>
+          <a:effectLst>
+            <a:glow rad="228600">
+              <a:schemeClr val="tx1">
+                <a:alpha val="40000"/>
+              </a:schemeClr>
+            </a:glow>
+          </a:effectLst>
+        </p:grpSpPr>
+        <p:pic>
+          <p:nvPicPr>
+            <p:cNvPr id="13315" name="Picture 3"/>
+            <p:cNvPicPr>
+              <a:picLocks noChangeAspect="1" noChangeArrowheads="1"/>
+            </p:cNvPicPr>
+            <p:nvPr/>
+          </p:nvPicPr>
+          <p:blipFill>
+            <a:blip r:embed="rId3"/>
+            <a:srcRect/>
+            <a:stretch>
+              <a:fillRect/>
+            </a:stretch>
+          </p:blipFill>
+          <p:spPr bwMode="auto">
+            <a:xfrm>
+              <a:off x="4832352" y="4870460"/>
+              <a:ext cx="3943350" cy="1704975"/>
+            </a:xfrm>
+            <a:prstGeom prst="rect">
+              <a:avLst/>
+            </a:prstGeom>
+            <a:noFill/>
+            <a:ln w="9525">
+              <a:noFill/>
+              <a:miter lim="800000"/>
+              <a:headEnd/>
+              <a:tailEnd/>
+            </a:ln>
+            <a:effectLst/>
+          </p:spPr>
+        </p:pic>
+        <p:pic>
+          <p:nvPicPr>
+            <p:cNvPr id="13316" name="Picture 4" descr="C:\Documents and Settings\Mizu\Meus documentos\FEI\TCC\DOCS\Apresentação\RV_semWide.JPG"/>
+            <p:cNvPicPr>
+              <a:picLocks noChangeAspect="1" noChangeArrowheads="1"/>
+            </p:cNvPicPr>
+            <p:nvPr/>
+          </p:nvPicPr>
+          <p:blipFill>
+            <a:blip r:embed="rId4"/>
+            <a:srcRect/>
+            <a:stretch>
+              <a:fillRect/>
+            </a:stretch>
+          </p:blipFill>
+          <p:spPr bwMode="auto">
+            <a:xfrm>
+              <a:off x="4857752" y="3143248"/>
+              <a:ext cx="3914776" cy="1724025"/>
+            </a:xfrm>
+            <a:prstGeom prst="rect">
+              <a:avLst/>
+            </a:prstGeom>
+            <a:noFill/>
+            <a:ln>
+              <a:noFill/>
+            </a:ln>
+            <a:effectLst/>
+          </p:spPr>
+        </p:pic>
+      </p:grpSp>
     </p:spTree>
   </p:cSld>
   <p:clrMapOvr>
     <a:masterClrMapping/>
   </p:clrMapOvr>
-  <p:transition/>
+  <p:transition>
+    <p:fade/>
+  </p:transition>
   <p:timing>
     <p:tnLst>
       <p:par>

</xml_diff>

<commit_message>
planilha com analise dos resultados, e alteração da apresentação. tem q colcoar os resultados obtidos e to pensando em encurtar a enrolação que tem no começo
</commit_message>
<xml_diff>
--- a/DOCS/Apresentação/Apresentação_Final.pptx
+++ b/DOCS/Apresentação/Apresentação_Final.pptx
@@ -5,7 +5,7 @@
     <p:sldMasterId id="2147484104" r:id="rId1"/>
   </p:sldMasterIdLst>
   <p:notesMasterIdLst>
-    <p:notesMasterId r:id="rId15"/>
+    <p:notesMasterId r:id="rId13"/>
   </p:notesMasterIdLst>
   <p:sldIdLst>
     <p:sldId id="260" r:id="rId2"/>
@@ -17,10 +17,8 @@
     <p:sldId id="266" r:id="rId8"/>
     <p:sldId id="267" r:id="rId9"/>
     <p:sldId id="268" r:id="rId10"/>
-    <p:sldId id="263" r:id="rId11"/>
-    <p:sldId id="269" r:id="rId12"/>
-    <p:sldId id="271" r:id="rId13"/>
-    <p:sldId id="270" r:id="rId14"/>
+    <p:sldId id="269" r:id="rId11"/>
+    <p:sldId id="270" r:id="rId12"/>
   </p:sldIdLst>
   <p:sldSz cx="9144000" cy="6858000" type="screen4x3"/>
   <p:notesSz cx="6858000" cy="9144000"/>
@@ -243,7 +241,7 @@
               <a:pPr>
                 <a:defRPr/>
               </a:pPr>
-              <a:t>24/11/2008</a:t>
+              <a:t>25/11/2008</a:t>
             </a:fld>
             <a:endParaRPr lang="pt-BR"/>
           </a:p>
@@ -783,7 +781,7 @@
               <a:pPr>
                 <a:defRPr/>
               </a:pPr>
-              <a:t>24/11/2008</a:t>
+              <a:t>25/11/2008</a:t>
             </a:fld>
             <a:endParaRPr lang="pt-BR"/>
           </a:p>
@@ -933,7 +931,7 @@
               <a:pPr>
                 <a:defRPr/>
               </a:pPr>
-              <a:t>24/11/2008</a:t>
+              <a:t>25/11/2008</a:t>
             </a:fld>
             <a:endParaRPr lang="pt-BR"/>
           </a:p>
@@ -1208,7 +1206,7 @@
               <a:pPr>
                 <a:defRPr/>
               </a:pPr>
-              <a:t>24/11/2008</a:t>
+              <a:t>25/11/2008</a:t>
             </a:fld>
             <a:endParaRPr lang="pt-BR"/>
           </a:p>
@@ -1404,7 +1402,7 @@
               <a:pPr>
                 <a:defRPr/>
               </a:pPr>
-              <a:t>24/11/2008</a:t>
+              <a:t>25/11/2008</a:t>
             </a:fld>
             <a:endParaRPr lang="pt-BR"/>
           </a:p>
@@ -1610,7 +1608,7 @@
               <a:pPr>
                 <a:defRPr/>
               </a:pPr>
-              <a:t>24/11/2008</a:t>
+              <a:t>25/11/2008</a:t>
             </a:fld>
             <a:endParaRPr lang="pt-BR"/>
           </a:p>
@@ -1727,7 +1725,7 @@
               <a:pPr>
                 <a:defRPr/>
               </a:pPr>
-              <a:t>24/11/2008</a:t>
+              <a:t>25/11/2008</a:t>
             </a:fld>
             <a:endParaRPr lang="pt-BR"/>
           </a:p>
@@ -2505,7 +2503,7 @@
               <a:pPr>
                 <a:defRPr/>
               </a:pPr>
-              <a:t>24/11/2008</a:t>
+              <a:t>25/11/2008</a:t>
             </a:fld>
             <a:endParaRPr lang="pt-BR"/>
           </a:p>
@@ -3324,166 +3322,6 @@
           </a:p>
         </p:txBody>
       </p:sp>
-      <p:pic>
-        <p:nvPicPr>
-          <p:cNvPr id="14338" name="Picture 2" descr="C:\Documents and Settings\Mizu\Meus documentos\FEI\TCC\LATEX\imagens\resultados_obtidos1.PNG"/>
-          <p:cNvPicPr>
-            <a:picLocks noChangeAspect="1" noChangeArrowheads="1"/>
-          </p:cNvPicPr>
-          <p:nvPr/>
-        </p:nvPicPr>
-        <p:blipFill>
-          <a:blip r:embed="rId2"/>
-          <a:srcRect/>
-          <a:stretch>
-            <a:fillRect/>
-          </a:stretch>
-        </p:blipFill>
-        <p:spPr bwMode="auto">
-          <a:xfrm>
-            <a:off x="928662" y="1000108"/>
-            <a:ext cx="7734330" cy="5568076"/>
-          </a:xfrm>
-          <a:prstGeom prst="rect">
-            <a:avLst/>
-          </a:prstGeom>
-          <a:noFill/>
-        </p:spPr>
-      </p:pic>
-    </p:spTree>
-  </p:cSld>
-  <p:clrMapOvr>
-    <a:masterClrMapping/>
-  </p:clrMapOvr>
-  <p:transition/>
-  <p:timing>
-    <p:tnLst>
-      <p:par>
-        <p:cTn id="1" dur="indefinite" restart="never" nodeType="tmRoot"/>
-      </p:par>
-    </p:tnLst>
-  </p:timing>
-</p:sld>
-</file>
-
-<file path=ppt/slides/slide11.xml><?xml version="1.0" encoding="utf-8"?>
-<p:sld xmlns:a="http://schemas.openxmlformats.org/drawingml/2006/main" xmlns:r="http://schemas.openxmlformats.org/officeDocument/2006/relationships" xmlns:p="http://schemas.openxmlformats.org/presentationml/2006/main">
-  <p:cSld>
-    <p:spTree>
-      <p:nvGrpSpPr>
-        <p:cNvPr id="1" name=""/>
-        <p:cNvGrpSpPr/>
-        <p:nvPr/>
-      </p:nvGrpSpPr>
-      <p:grpSpPr>
-        <a:xfrm>
-          <a:off x="0" y="0"/>
-          <a:ext cx="0" cy="0"/>
-          <a:chOff x="0" y="0"/>
-          <a:chExt cx="0" cy="0"/>
-        </a:xfrm>
-      </p:grpSpPr>
-      <p:sp>
-        <p:nvSpPr>
-          <p:cNvPr id="3" name="Título 1"/>
-          <p:cNvSpPr txBox="1">
-            <a:spLocks/>
-          </p:cNvSpPr>
-          <p:nvPr/>
-        </p:nvSpPr>
-        <p:spPr>
-          <a:xfrm>
-            <a:off x="857224" y="214290"/>
-            <a:ext cx="7772400" cy="914400"/>
-          </a:xfrm>
-          <a:prstGeom prst="rect">
-            <a:avLst/>
-          </a:prstGeom>
-        </p:spPr>
-        <p:txBody>
-          <a:bodyPr/>
-          <a:lstStyle/>
-          <a:p>
-            <a:pPr algn="ctr" fontAlgn="auto">
-              <a:spcAft>
-                <a:spcPts val="0"/>
-              </a:spcAft>
-              <a:defRPr/>
-            </a:pPr>
-            <a:r>
-              <a:rPr lang="pt-BR" sz="4400" b="1" u="none" cap="all" dirty="0">
-                <a:solidFill>
-                  <a:schemeClr val="tx2">
-                    <a:satMod val="200000"/>
-                  </a:schemeClr>
-                </a:solidFill>
-                <a:effectLst>
-                  <a:reflection blurRad="12700" stA="34000" endA="740" endPos="53000" dir="5400000" sy="-100000" algn="bl" rotWithShape="0"/>
-                </a:effectLst>
-                <a:latin typeface="Tahoma" pitchFamily="34" charset="0"/>
-                <a:ea typeface="+mj-ea"/>
-                <a:cs typeface="Tahoma" pitchFamily="34" charset="0"/>
-              </a:rPr>
-              <a:t>Resultados </a:t>
-            </a:r>
-            <a:r>
-              <a:rPr lang="pt-BR" sz="4400" b="1" u="none" cap="all" dirty="0" smtClean="0">
-                <a:solidFill>
-                  <a:schemeClr val="tx2">
-                    <a:satMod val="200000"/>
-                  </a:schemeClr>
-                </a:solidFill>
-                <a:effectLst>
-                  <a:reflection blurRad="12700" stA="34000" endA="740" endPos="53000" dir="5400000" sy="-100000" algn="bl" rotWithShape="0"/>
-                </a:effectLst>
-                <a:latin typeface="Tahoma" pitchFamily="34" charset="0"/>
-                <a:ea typeface="+mj-ea"/>
-                <a:cs typeface="Tahoma" pitchFamily="34" charset="0"/>
-              </a:rPr>
-              <a:t>obtidos</a:t>
-            </a:r>
-            <a:endParaRPr lang="pt-BR" sz="4400" b="1" u="none" cap="all" dirty="0">
-              <a:solidFill>
-                <a:schemeClr val="tx2">
-                  <a:satMod val="200000"/>
-                </a:schemeClr>
-              </a:solidFill>
-              <a:effectLst>
-                <a:reflection blurRad="12700" stA="34000" endA="740" endPos="53000" dir="5400000" sy="-100000" algn="bl" rotWithShape="0"/>
-              </a:effectLst>
-              <a:latin typeface="Tahoma" pitchFamily="34" charset="0"/>
-              <a:ea typeface="+mj-ea"/>
-              <a:cs typeface="Tahoma" pitchFamily="34" charset="0"/>
-            </a:endParaRPr>
-          </a:p>
-        </p:txBody>
-      </p:sp>
-      <p:pic>
-        <p:nvPicPr>
-          <p:cNvPr id="5" name="Picture 2" descr="C:\Documents and Settings\Mizu\Meus documentos\FEI\TCC\LATEX\imagens\resultados_obtidos2.PNG"/>
-          <p:cNvPicPr>
-            <a:picLocks noChangeAspect="1" noChangeArrowheads="1"/>
-          </p:cNvPicPr>
-          <p:nvPr/>
-        </p:nvPicPr>
-        <p:blipFill>
-          <a:blip r:embed="rId2"/>
-          <a:srcRect/>
-          <a:stretch>
-            <a:fillRect/>
-          </a:stretch>
-        </p:blipFill>
-        <p:spPr bwMode="auto">
-          <a:xfrm>
-            <a:off x="928662" y="981566"/>
-            <a:ext cx="7762936" cy="5588669"/>
-          </a:xfrm>
-          <a:prstGeom prst="rect">
-            <a:avLst/>
-          </a:prstGeom>
-          <a:noFill/>
-        </p:spPr>
-      </p:pic>
     </p:spTree>
   </p:cSld>
   <p:clrMapOvr>
@@ -3499,140 +3337,7 @@
 </p:sld>
 </file>
 
-<file path=ppt/slides/slide12.xml><?xml version="1.0" encoding="utf-8"?>
-<p:sld xmlns:a="http://schemas.openxmlformats.org/drawingml/2006/main" xmlns:r="http://schemas.openxmlformats.org/officeDocument/2006/relationships" xmlns:p="http://schemas.openxmlformats.org/presentationml/2006/main">
-  <p:cSld>
-    <p:spTree>
-      <p:nvGrpSpPr>
-        <p:cNvPr id="1" name=""/>
-        <p:cNvGrpSpPr/>
-        <p:nvPr/>
-      </p:nvGrpSpPr>
-      <p:grpSpPr>
-        <a:xfrm>
-          <a:off x="0" y="0"/>
-          <a:ext cx="0" cy="0"/>
-          <a:chOff x="0" y="0"/>
-          <a:chExt cx="0" cy="0"/>
-        </a:xfrm>
-      </p:grpSpPr>
-      <p:sp>
-        <p:nvSpPr>
-          <p:cNvPr id="6" name="Título 1"/>
-          <p:cNvSpPr txBox="1">
-            <a:spLocks/>
-          </p:cNvSpPr>
-          <p:nvPr/>
-        </p:nvSpPr>
-        <p:spPr>
-          <a:xfrm>
-            <a:off x="857224" y="214290"/>
-            <a:ext cx="7772400" cy="914400"/>
-          </a:xfrm>
-          <a:prstGeom prst="rect">
-            <a:avLst/>
-          </a:prstGeom>
-        </p:spPr>
-        <p:txBody>
-          <a:bodyPr/>
-          <a:lstStyle/>
-          <a:p>
-            <a:pPr algn="ctr" fontAlgn="auto">
-              <a:spcAft>
-                <a:spcPts val="0"/>
-              </a:spcAft>
-              <a:defRPr/>
-            </a:pPr>
-            <a:r>
-              <a:rPr lang="pt-BR" sz="4400" b="1" u="none" cap="all" dirty="0">
-                <a:solidFill>
-                  <a:schemeClr val="tx2">
-                    <a:satMod val="200000"/>
-                  </a:schemeClr>
-                </a:solidFill>
-                <a:effectLst>
-                  <a:reflection blurRad="12700" stA="34000" endA="740" endPos="53000" dir="5400000" sy="-100000" algn="bl" rotWithShape="0"/>
-                </a:effectLst>
-                <a:latin typeface="Tahoma" pitchFamily="34" charset="0"/>
-                <a:ea typeface="+mj-ea"/>
-                <a:cs typeface="Tahoma" pitchFamily="34" charset="0"/>
-              </a:rPr>
-              <a:t>Resultados </a:t>
-            </a:r>
-            <a:r>
-              <a:rPr lang="pt-BR" sz="4400" b="1" u="none" cap="all" dirty="0" smtClean="0">
-                <a:solidFill>
-                  <a:schemeClr val="tx2">
-                    <a:satMod val="200000"/>
-                  </a:schemeClr>
-                </a:solidFill>
-                <a:effectLst>
-                  <a:reflection blurRad="12700" stA="34000" endA="740" endPos="53000" dir="5400000" sy="-100000" algn="bl" rotWithShape="0"/>
-                </a:effectLst>
-                <a:latin typeface="Tahoma" pitchFamily="34" charset="0"/>
-                <a:ea typeface="+mj-ea"/>
-                <a:cs typeface="Tahoma" pitchFamily="34" charset="0"/>
-              </a:rPr>
-              <a:t>obtidos</a:t>
-            </a:r>
-            <a:endParaRPr lang="pt-BR" sz="4400" b="1" u="none" cap="all" dirty="0">
-              <a:solidFill>
-                <a:schemeClr val="tx2">
-                  <a:satMod val="200000"/>
-                </a:schemeClr>
-              </a:solidFill>
-              <a:effectLst>
-                <a:reflection blurRad="12700" stA="34000" endA="740" endPos="53000" dir="5400000" sy="-100000" algn="bl" rotWithShape="0"/>
-              </a:effectLst>
-              <a:latin typeface="Tahoma" pitchFamily="34" charset="0"/>
-              <a:ea typeface="+mj-ea"/>
-              <a:cs typeface="Tahoma" pitchFamily="34" charset="0"/>
-            </a:endParaRPr>
-          </a:p>
-        </p:txBody>
-      </p:sp>
-      <p:pic>
-        <p:nvPicPr>
-          <p:cNvPr id="7" name="Picture 2" descr="C:\Documents and Settings\Mizu\Meus documentos\FEI\TCC\LATEX\imagens\resultados_obtidos3.PNG"/>
-          <p:cNvPicPr>
-            <a:picLocks noChangeAspect="1" noChangeArrowheads="1"/>
-          </p:cNvPicPr>
-          <p:nvPr/>
-        </p:nvPicPr>
-        <p:blipFill>
-          <a:blip r:embed="rId2"/>
-          <a:srcRect/>
-          <a:stretch>
-            <a:fillRect/>
-          </a:stretch>
-        </p:blipFill>
-        <p:spPr bwMode="auto">
-          <a:xfrm>
-            <a:off x="928662" y="1000107"/>
-            <a:ext cx="7715304" cy="5554377"/>
-          </a:xfrm>
-          <a:prstGeom prst="rect">
-            <a:avLst/>
-          </a:prstGeom>
-          <a:noFill/>
-        </p:spPr>
-      </p:pic>
-    </p:spTree>
-  </p:cSld>
-  <p:clrMapOvr>
-    <a:masterClrMapping/>
-  </p:clrMapOvr>
-  <p:timing>
-    <p:tnLst>
-      <p:par>
-        <p:cTn id="1" dur="indefinite" restart="never" nodeType="tmRoot"/>
-      </p:par>
-    </p:tnLst>
-  </p:timing>
-</p:sld>
-</file>
-
-<file path=ppt/slides/slide13.xml><?xml version="1.0" encoding="utf-8"?>
+<file path=ppt/slides/slide11.xml><?xml version="1.0" encoding="utf-8"?>
 <p:sld xmlns:a="http://schemas.openxmlformats.org/drawingml/2006/main" xmlns:r="http://schemas.openxmlformats.org/officeDocument/2006/relationships" xmlns:p="http://schemas.openxmlformats.org/presentationml/2006/main">
   <p:cSld>
     <p:spTree>
@@ -10817,6 +10522,72 @@
           </a:p>
         </p:txBody>
       </p:sp>
+      <p:pic>
+        <p:nvPicPr>
+          <p:cNvPr id="13314" name="Picture 2" descr="C:\Documents and Settings\Mizu\Meus documentos\FEI\TCC\DOCS\Apresentação\RV_semWide.JPG"/>
+          <p:cNvPicPr>
+            <a:picLocks noChangeAspect="1" noChangeArrowheads="1"/>
+          </p:cNvPicPr>
+          <p:nvPr/>
+        </p:nvPicPr>
+        <p:blipFill>
+          <a:blip r:embed="rId3"/>
+          <a:srcRect/>
+          <a:stretch>
+            <a:fillRect/>
+          </a:stretch>
+        </p:blipFill>
+        <p:spPr bwMode="auto">
+          <a:xfrm>
+            <a:off x="4857752" y="4857760"/>
+            <a:ext cx="3914775" cy="1724025"/>
+          </a:xfrm>
+          <a:prstGeom prst="rect">
+            <a:avLst/>
+          </a:prstGeom>
+          <a:noFill/>
+          <a:effectLst>
+            <a:glow rad="228600">
+              <a:schemeClr val="tx1">
+                <a:alpha val="40000"/>
+              </a:schemeClr>
+            </a:glow>
+          </a:effectLst>
+        </p:spPr>
+      </p:pic>
+      <p:pic>
+        <p:nvPicPr>
+          <p:cNvPr id="13315" name="Picture 3" descr="C:\Documents and Settings\Mizu\Meus documentos\FEI\TCC\DOCS\Apresentação\RV.JPG"/>
+          <p:cNvPicPr>
+            <a:picLocks noChangeAspect="1" noChangeArrowheads="1"/>
+          </p:cNvPicPr>
+          <p:nvPr/>
+        </p:nvPicPr>
+        <p:blipFill>
+          <a:blip r:embed="rId4"/>
+          <a:srcRect/>
+          <a:stretch>
+            <a:fillRect/>
+          </a:stretch>
+        </p:blipFill>
+        <p:spPr bwMode="auto">
+          <a:xfrm>
+            <a:off x="714348" y="2000240"/>
+            <a:ext cx="3933825" cy="3028950"/>
+          </a:xfrm>
+          <a:prstGeom prst="rect">
+            <a:avLst/>
+          </a:prstGeom>
+          <a:noFill/>
+          <a:effectLst>
+            <a:glow rad="228600">
+              <a:schemeClr val="tx1">
+                <a:alpha val="40000"/>
+              </a:schemeClr>
+            </a:glow>
+          </a:effectLst>
+        </p:spPr>
+      </p:pic>
     </p:spTree>
   </p:cSld>
   <p:clrMapOvr>
@@ -11007,91 +10778,6 @@
           </a:p>
         </p:txBody>
       </p:sp>
-      <p:sp>
-        <p:nvSpPr>
-          <p:cNvPr id="6" name="Retângulo 5"/>
-          <p:cNvSpPr/>
-          <p:nvPr/>
-        </p:nvSpPr>
-        <p:spPr>
-          <a:xfrm>
-            <a:off x="357158" y="1857364"/>
-            <a:ext cx="3714776" cy="1379865"/>
-          </a:xfrm>
-          <a:prstGeom prst="rect">
-            <a:avLst/>
-          </a:prstGeom>
-        </p:spPr>
-        <p:txBody>
-          <a:bodyPr wrap="square">
-            <a:spAutoFit/>
-          </a:bodyPr>
-          <a:lstStyle/>
-          <a:p>
-            <a:pPr marL="411163" indent="-342900">
-              <a:spcBef>
-                <a:spcPts val="700"/>
-              </a:spcBef>
-              <a:buClr>
-                <a:schemeClr val="tx2"/>
-              </a:buClr>
-              <a:buSzPct val="95000"/>
-              <a:buFont typeface="Wingdings" pitchFamily="2" charset="2"/>
-              <a:buChar char=""/>
-            </a:pPr>
-            <a:r>
-              <a:rPr lang="pt-BR" sz="2400" u="none" dirty="0" err="1" smtClean="0">
-                <a:latin typeface="Corbel" pitchFamily="34" charset="0"/>
-              </a:rPr>
-              <a:t>Convolução</a:t>
-            </a:r>
-            <a:r>
-              <a:rPr lang="pt-BR" sz="2400" u="none" dirty="0" smtClean="0">
-                <a:latin typeface="Corbel" pitchFamily="34" charset="0"/>
-              </a:rPr>
-              <a:t> da Imagem</a:t>
-            </a:r>
-          </a:p>
-          <a:p>
-            <a:pPr marL="411163" indent="-342900">
-              <a:spcBef>
-                <a:spcPts val="700"/>
-              </a:spcBef>
-              <a:buClr>
-                <a:schemeClr val="tx2"/>
-              </a:buClr>
-              <a:buSzPct val="95000"/>
-              <a:buFont typeface="Wingdings" pitchFamily="2" charset="2"/>
-              <a:buChar char=""/>
-            </a:pPr>
-            <a:r>
-              <a:rPr lang="pt-BR" sz="2400" u="none" dirty="0" smtClean="0">
-                <a:latin typeface="Corbel" pitchFamily="34" charset="0"/>
-              </a:rPr>
-              <a:t>Supressão Não Máxima</a:t>
-            </a:r>
-          </a:p>
-          <a:p>
-            <a:pPr marL="411163" indent="-342900">
-              <a:spcBef>
-                <a:spcPts val="700"/>
-              </a:spcBef>
-              <a:buClr>
-                <a:schemeClr val="tx2"/>
-              </a:buClr>
-              <a:buSzPct val="95000"/>
-              <a:buFont typeface="Wingdings" pitchFamily="2" charset="2"/>
-              <a:buChar char=""/>
-            </a:pPr>
-            <a:r>
-              <a:rPr lang="pt-BR" sz="2400" u="none" dirty="0" smtClean="0">
-                <a:latin typeface="Corbel" pitchFamily="34" charset="0"/>
-              </a:rPr>
-              <a:t>Histerese</a:t>
-            </a:r>
-          </a:p>
-        </p:txBody>
-      </p:sp>
       <p:grpSp>
         <p:nvGrpSpPr>
           <p:cNvPr id="13" name="Grupo 12"/>
@@ -11100,8 +10786,8 @@
         </p:nvGrpSpPr>
         <p:grpSpPr>
           <a:xfrm>
-            <a:off x="4214810" y="2000240"/>
-            <a:ext cx="4657730" cy="4071966"/>
+            <a:off x="1643042" y="1500174"/>
+            <a:ext cx="6429420" cy="4786346"/>
             <a:chOff x="4832352" y="3143248"/>
             <a:chExt cx="3943350" cy="3432187"/>
           </a:xfrm>

</xml_diff>